<commit_message>
Simple harmonic motion adds/edits
</commit_message>
<xml_diff>
--- a/tex/figures/SimpleHarmonicMotion/Figures.pptx
+++ b/tex/figures/SimpleHarmonicMotion/Figures.pptx
@@ -10,6 +10,7 @@
     <p:sldId id="273" r:id="rId4"/>
     <p:sldId id="274" r:id="rId5"/>
     <p:sldId id="275" r:id="rId6"/>
+    <p:sldId id="276" r:id="rId7"/>
   </p:sldIdLst>
   <p:sldSz cx="12192000" cy="6858000"/>
   <p:notesSz cx="6858000" cy="9144000"/>
@@ -247,7 +248,7 @@
           <a:p>
             <a:fld id="{F7249F8D-641B-4CAF-BAE5-10524742F6F1}" type="datetimeFigureOut">
               <a:rPr lang="en-CA" smtClean="0"/>
-              <a:t>2018-07-16</a:t>
+              <a:t>2018-07-23</a:t>
             </a:fld>
             <a:endParaRPr lang="en-CA"/>
           </a:p>
@@ -417,7 +418,7 @@
           <a:p>
             <a:fld id="{F7249F8D-641B-4CAF-BAE5-10524742F6F1}" type="datetimeFigureOut">
               <a:rPr lang="en-CA" smtClean="0"/>
-              <a:t>2018-07-16</a:t>
+              <a:t>2018-07-23</a:t>
             </a:fld>
             <a:endParaRPr lang="en-CA"/>
           </a:p>
@@ -597,7 +598,7 @@
           <a:p>
             <a:fld id="{F7249F8D-641B-4CAF-BAE5-10524742F6F1}" type="datetimeFigureOut">
               <a:rPr lang="en-CA" smtClean="0"/>
-              <a:t>2018-07-16</a:t>
+              <a:t>2018-07-23</a:t>
             </a:fld>
             <a:endParaRPr lang="en-CA"/>
           </a:p>
@@ -767,7 +768,7 @@
           <a:p>
             <a:fld id="{F7249F8D-641B-4CAF-BAE5-10524742F6F1}" type="datetimeFigureOut">
               <a:rPr lang="en-CA" smtClean="0"/>
-              <a:t>2018-07-16</a:t>
+              <a:t>2018-07-23</a:t>
             </a:fld>
             <a:endParaRPr lang="en-CA"/>
           </a:p>
@@ -1013,7 +1014,7 @@
           <a:p>
             <a:fld id="{F7249F8D-641B-4CAF-BAE5-10524742F6F1}" type="datetimeFigureOut">
               <a:rPr lang="en-CA" smtClean="0"/>
-              <a:t>2018-07-16</a:t>
+              <a:t>2018-07-23</a:t>
             </a:fld>
             <a:endParaRPr lang="en-CA"/>
           </a:p>
@@ -1245,7 +1246,7 @@
           <a:p>
             <a:fld id="{F7249F8D-641B-4CAF-BAE5-10524742F6F1}" type="datetimeFigureOut">
               <a:rPr lang="en-CA" smtClean="0"/>
-              <a:t>2018-07-16</a:t>
+              <a:t>2018-07-23</a:t>
             </a:fld>
             <a:endParaRPr lang="en-CA"/>
           </a:p>
@@ -1612,7 +1613,7 @@
           <a:p>
             <a:fld id="{F7249F8D-641B-4CAF-BAE5-10524742F6F1}" type="datetimeFigureOut">
               <a:rPr lang="en-CA" smtClean="0"/>
-              <a:t>2018-07-16</a:t>
+              <a:t>2018-07-23</a:t>
             </a:fld>
             <a:endParaRPr lang="en-CA"/>
           </a:p>
@@ -1730,7 +1731,7 @@
           <a:p>
             <a:fld id="{F7249F8D-641B-4CAF-BAE5-10524742F6F1}" type="datetimeFigureOut">
               <a:rPr lang="en-CA" smtClean="0"/>
-              <a:t>2018-07-16</a:t>
+              <a:t>2018-07-23</a:t>
             </a:fld>
             <a:endParaRPr lang="en-CA"/>
           </a:p>
@@ -1825,7 +1826,7 @@
           <a:p>
             <a:fld id="{F7249F8D-641B-4CAF-BAE5-10524742F6F1}" type="datetimeFigureOut">
               <a:rPr lang="en-CA" smtClean="0"/>
-              <a:t>2018-07-16</a:t>
+              <a:t>2018-07-23</a:t>
             </a:fld>
             <a:endParaRPr lang="en-CA"/>
           </a:p>
@@ -2102,7 +2103,7 @@
           <a:p>
             <a:fld id="{F7249F8D-641B-4CAF-BAE5-10524742F6F1}" type="datetimeFigureOut">
               <a:rPr lang="en-CA" smtClean="0"/>
-              <a:t>2018-07-16</a:t>
+              <a:t>2018-07-23</a:t>
             </a:fld>
             <a:endParaRPr lang="en-CA"/>
           </a:p>
@@ -2355,7 +2356,7 @@
           <a:p>
             <a:fld id="{F7249F8D-641B-4CAF-BAE5-10524742F6F1}" type="datetimeFigureOut">
               <a:rPr lang="en-CA" smtClean="0"/>
-              <a:t>2018-07-16</a:t>
+              <a:t>2018-07-23</a:t>
             </a:fld>
             <a:endParaRPr lang="en-CA"/>
           </a:p>
@@ -2568,7 +2569,7 @@
           <a:p>
             <a:fld id="{F7249F8D-641B-4CAF-BAE5-10524742F6F1}" type="datetimeFigureOut">
               <a:rPr lang="en-CA" smtClean="0"/>
-              <a:t>2018-07-16</a:t>
+              <a:t>2018-07-23</a:t>
             </a:fld>
             <a:endParaRPr lang="en-CA"/>
           </a:p>
@@ -7950,7 +7951,7 @@
                               <m:chr m:val="⃗"/>
                               <m:ctrlPr>
                                 <a:rPr lang="en-US" sz="2000" b="0" i="1" smtClean="0">
-                                  <a:latin typeface="Cambria Math" panose="02040503050406030204" pitchFamily="18" charset="0"/>
+                                  <a:latin typeface="Cambria Math" charset="0"/>
                                   <a:cs typeface="Arial" panose="020B0604020202020204" pitchFamily="34" charset="0"/>
                                 </a:rPr>
                               </m:ctrlPr>
@@ -8087,7 +8088,7 @@
                               <m:chr m:val="⃗"/>
                               <m:ctrlPr>
                                 <a:rPr lang="en-US" sz="2000" b="0" i="1" smtClean="0">
-                                  <a:latin typeface="Cambria Math" panose="02040503050406030204" pitchFamily="18" charset="0"/>
+                                  <a:latin typeface="Cambria Math" charset="0"/>
                                   <a:cs typeface="Arial" panose="020B0604020202020204" pitchFamily="34" charset="0"/>
                                 </a:rPr>
                               </m:ctrlPr>
@@ -10375,7 +10376,7 @@
                                 <m:chr m:val="⃗"/>
                                 <m:ctrlPr>
                                   <a:rPr lang="en-US" b="0" i="1" smtClean="0">
-                                    <a:latin typeface="Cambria Math" panose="02040503050406030204" pitchFamily="18" charset="0"/>
+                                    <a:latin typeface="Cambria Math" charset="0"/>
                                   </a:rPr>
                                 </m:ctrlPr>
                               </m:accPr>
@@ -10740,7 +10741,7 @@
                               <m:sSubPr>
                                 <m:ctrlPr>
                                   <a:rPr lang="en-US" b="0" i="1" smtClean="0">
-                                    <a:latin typeface="Cambria Math" panose="02040503050406030204" pitchFamily="18" charset="0"/>
+                                    <a:latin typeface="Cambria Math" charset="0"/>
                                   </a:rPr>
                                 </m:ctrlPr>
                               </m:sSubPr>
@@ -10936,7 +10937,7 @@
                               <m:sSubPr>
                                 <m:ctrlPr>
                                   <a:rPr lang="en-US" b="0" i="1" smtClean="0">
-                                    <a:latin typeface="Cambria Math" panose="02040503050406030204" pitchFamily="18" charset="0"/>
+                                    <a:latin typeface="Cambria Math" charset="0"/>
                                   </a:rPr>
                                 </m:ctrlPr>
                               </m:sSubPr>
@@ -13265,7 +13266,7 @@
                               <m:sSubPr>
                                 <m:ctrlPr>
                                   <a:rPr lang="en-US" sz="2000" b="0" i="1" smtClean="0">
-                                    <a:latin typeface="Cambria Math" panose="02040503050406030204" pitchFamily="18" charset="0"/>
+                                    <a:latin typeface="Cambria Math" charset="0"/>
                                     <a:cs typeface="Arial" panose="020B0604020202020204" pitchFamily="34" charset="0"/>
                                   </a:rPr>
                                 </m:ctrlPr>
@@ -13583,7 +13584,7 @@
                             <m:sSubPr>
                               <m:ctrlPr>
                                 <a:rPr lang="en-US" sz="2000" b="0" i="1" smtClean="0">
-                                  <a:latin typeface="Cambria Math" panose="02040503050406030204" pitchFamily="18" charset="0"/>
+                                  <a:latin typeface="Cambria Math" charset="0"/>
                                   <a:cs typeface="Arial" panose="020B0604020202020204" pitchFamily="34" charset="0"/>
                                 </a:rPr>
                               </m:ctrlPr>
@@ -13594,7 +13595,7 @@
                                   <m:chr m:val="⃗"/>
                                   <m:ctrlPr>
                                     <a:rPr lang="en-US" sz="2000" b="0" i="1" smtClean="0">
-                                      <a:latin typeface="Cambria Math" panose="02040503050406030204" pitchFamily="18" charset="0"/>
+                                      <a:latin typeface="Cambria Math" charset="0"/>
                                       <a:cs typeface="Arial" panose="020B0604020202020204" pitchFamily="34" charset="0"/>
                                     </a:rPr>
                                   </m:ctrlPr>
@@ -13706,7 +13707,7 @@
                               <m:chr m:val="⃗"/>
                               <m:ctrlPr>
                                 <a:rPr lang="en-US" sz="2000" b="0" i="1" smtClean="0">
-                                  <a:latin typeface="Cambria Math" panose="02040503050406030204" pitchFamily="18" charset="0"/>
+                                  <a:latin typeface="Cambria Math" charset="0"/>
                                   <a:cs typeface="Arial" panose="020B0604020202020204" pitchFamily="34" charset="0"/>
                                 </a:rPr>
                               </m:ctrlPr>
@@ -13732,7 +13733,7 @@
                             <m:sSubPr>
                               <m:ctrlPr>
                                 <a:rPr lang="en-US" sz="2000" b="0" i="1" smtClean="0">
-                                  <a:latin typeface="Cambria Math" panose="02040503050406030204" pitchFamily="18" charset="0"/>
+                                  <a:latin typeface="Cambria Math" charset="0"/>
                                   <a:cs typeface="Arial" panose="020B0604020202020204" pitchFamily="34" charset="0"/>
                                 </a:rPr>
                               </m:ctrlPr>
@@ -13968,7 +13969,7 @@
                             <m:sSubPr>
                               <m:ctrlPr>
                                 <a:rPr lang="en-US" sz="2000" b="0" i="1" smtClean="0">
-                                  <a:latin typeface="Cambria Math" panose="02040503050406030204" pitchFamily="18" charset="0"/>
+                                  <a:latin typeface="Cambria Math" charset="0"/>
                                   <a:cs typeface="Arial" panose="020B0604020202020204" pitchFamily="34" charset="0"/>
                                 </a:rPr>
                               </m:ctrlPr>
@@ -13979,7 +13980,7 @@
                                   <m:chr m:val="⃗"/>
                                   <m:ctrlPr>
                                     <a:rPr lang="en-US" sz="2000" b="0" i="1" smtClean="0">
-                                      <a:latin typeface="Cambria Math" panose="02040503050406030204" pitchFamily="18" charset="0"/>
+                                      <a:latin typeface="Cambria Math" charset="0"/>
                                       <a:cs typeface="Arial" panose="020B0604020202020204" pitchFamily="34" charset="0"/>
                                     </a:rPr>
                                   </m:ctrlPr>
@@ -14091,7 +14092,7 @@
                               <m:chr m:val="⃗"/>
                               <m:ctrlPr>
                                 <a:rPr lang="en-US" sz="2000" b="0" i="1" smtClean="0">
-                                  <a:latin typeface="Cambria Math" panose="02040503050406030204" pitchFamily="18" charset="0"/>
+                                  <a:latin typeface="Cambria Math" charset="0"/>
                                   <a:cs typeface="Arial" panose="020B0604020202020204" pitchFamily="34" charset="0"/>
                                 </a:rPr>
                               </m:ctrlPr>
@@ -18275,7 +18276,7 @@
                           <m:sSubPr>
                             <m:ctrlPr>
                               <a:rPr lang="en-US" sz="2000" b="0" i="1" smtClean="0">
-                                <a:latin typeface="Cambria Math" panose="02040503050406030204" pitchFamily="18" charset="0"/>
+                                <a:latin typeface="Cambria Math" charset="0"/>
                                 <a:cs typeface="Arial" panose="020B0604020202020204" pitchFamily="34" charset="0"/>
                               </a:rPr>
                             </m:ctrlPr>
@@ -18384,7 +18385,7 @@
                           <m:sSubPr>
                             <m:ctrlPr>
                               <a:rPr lang="en-US" sz="2000" b="0" i="1" smtClean="0">
-                                <a:latin typeface="Cambria Math" panose="02040503050406030204" pitchFamily="18" charset="0"/>
+                                <a:latin typeface="Cambria Math" charset="0"/>
                                 <a:cs typeface="Arial" panose="020B0604020202020204" pitchFamily="34" charset="0"/>
                               </a:rPr>
                             </m:ctrlPr>
@@ -18530,8 +18531,8 @@
             </a:fontRef>
           </p:style>
         </p:cxnSp>
-        <mc:AlternateContent xmlns:mc="http://schemas.openxmlformats.org/markup-compatibility/2006">
-          <mc:Choice xmlns:a14="http://schemas.microsoft.com/office/drawing/2010/main" Requires="a14">
+        <mc:AlternateContent xmlns:mc="http://schemas.openxmlformats.org/markup-compatibility/2006" xmlns:a14="http://schemas.microsoft.com/office/drawing/2010/main">
+          <mc:Choice Requires="a14">
             <p:sp>
               <p:nvSpPr>
                 <p:cNvPr id="35" name="TextBox 34"/>
@@ -18565,7 +18566,7 @@
                           <m:sSubPr>
                             <m:ctrlPr>
                               <a:rPr lang="en-US" sz="2000" b="0" i="1" smtClean="0">
-                                <a:latin typeface="Cambria Math" panose="02040503050406030204" pitchFamily="18" charset="0"/>
+                                <a:latin typeface="Cambria Math" charset="0"/>
                                 <a:cs typeface="Arial" panose="020B0604020202020204" pitchFamily="34" charset="0"/>
                               </a:rPr>
                             </m:ctrlPr>
@@ -18576,7 +18577,7 @@
                                 <m:chr m:val="⃗"/>
                                 <m:ctrlPr>
                                   <a:rPr lang="en-US" sz="2000" b="0" i="1" smtClean="0">
-                                    <a:latin typeface="Cambria Math" panose="02040503050406030204" pitchFamily="18" charset="0"/>
+                                    <a:latin typeface="Cambria Math" charset="0"/>
                                     <a:cs typeface="Arial" panose="020B0604020202020204" pitchFamily="34" charset="0"/>
                                   </a:rPr>
                                 </m:ctrlPr>
@@ -18613,7 +18614,7 @@
               </p:txBody>
             </p:sp>
           </mc:Choice>
-          <mc:Fallback>
+          <mc:Fallback xmlns="">
             <p:sp>
               <p:nvSpPr>
                 <p:cNvPr id="35" name="TextBox 34"/>
@@ -18687,7 +18688,7 @@
                           <m:sSubPr>
                             <m:ctrlPr>
                               <a:rPr lang="en-US" sz="2000" b="0" i="1" smtClean="0">
-                                <a:latin typeface="Cambria Math" panose="02040503050406030204" pitchFamily="18" charset="0"/>
+                                <a:latin typeface="Cambria Math" charset="0"/>
                                 <a:cs typeface="Arial" panose="020B0604020202020204" pitchFamily="34" charset="0"/>
                               </a:rPr>
                             </m:ctrlPr>
@@ -18698,7 +18699,7 @@
                                 <m:chr m:val="⃗"/>
                                 <m:ctrlPr>
                                   <a:rPr lang="en-US" sz="2000" b="0" i="1" smtClean="0">
-                                    <a:latin typeface="Cambria Math" panose="02040503050406030204" pitchFamily="18" charset="0"/>
+                                    <a:latin typeface="Cambria Math" charset="0"/>
                                     <a:cs typeface="Arial" panose="020B0604020202020204" pitchFamily="34" charset="0"/>
                                   </a:rPr>
                                 </m:ctrlPr>
@@ -18894,8 +18895,8 @@
             </a:fontRef>
           </p:style>
         </p:cxnSp>
-        <mc:AlternateContent xmlns:mc="http://schemas.openxmlformats.org/markup-compatibility/2006">
-          <mc:Choice xmlns:a14="http://schemas.microsoft.com/office/drawing/2010/main" Requires="a14">
+        <mc:AlternateContent xmlns:mc="http://schemas.openxmlformats.org/markup-compatibility/2006" xmlns:a14="http://schemas.microsoft.com/office/drawing/2010/main">
+          <mc:Choice Requires="a14">
             <p:sp>
               <p:nvSpPr>
                 <p:cNvPr id="40" name="TextBox 39"/>
@@ -18929,7 +18930,7 @@
                           <m:sSubPr>
                             <m:ctrlPr>
                               <a:rPr lang="en-US" sz="2000" b="0" i="1" smtClean="0">
-                                <a:latin typeface="Cambria Math" panose="02040503050406030204" pitchFamily="18" charset="0"/>
+                                <a:latin typeface="Cambria Math" charset="0"/>
                                 <a:cs typeface="Arial" panose="020B0604020202020204" pitchFamily="34" charset="0"/>
                               </a:rPr>
                             </m:ctrlPr>
@@ -18940,7 +18941,7 @@
                                 <m:chr m:val="⃗"/>
                                 <m:ctrlPr>
                                   <a:rPr lang="en-US" sz="2000" b="0" i="1" smtClean="0">
-                                    <a:latin typeface="Cambria Math" panose="02040503050406030204" pitchFamily="18" charset="0"/>
+                                    <a:latin typeface="Cambria Math" charset="0"/>
                                     <a:cs typeface="Arial" panose="020B0604020202020204" pitchFamily="34" charset="0"/>
                                   </a:rPr>
                                 </m:ctrlPr>
@@ -18977,7 +18978,7 @@
               </p:txBody>
             </p:sp>
           </mc:Choice>
-          <mc:Fallback>
+          <mc:Fallback xmlns="">
             <p:sp>
               <p:nvSpPr>
                 <p:cNvPr id="40" name="TextBox 39"/>
@@ -19016,8 +19017,8 @@
             </p:sp>
           </mc:Fallback>
         </mc:AlternateContent>
-        <mc:AlternateContent xmlns:mc="http://schemas.openxmlformats.org/markup-compatibility/2006">
-          <mc:Choice xmlns:a14="http://schemas.microsoft.com/office/drawing/2010/main" Requires="a14">
+        <mc:AlternateContent xmlns:mc="http://schemas.openxmlformats.org/markup-compatibility/2006" xmlns:a14="http://schemas.microsoft.com/office/drawing/2010/main">
+          <mc:Choice Requires="a14">
             <p:sp>
               <p:nvSpPr>
                 <p:cNvPr id="41" name="TextBox 40"/>
@@ -19051,7 +19052,7 @@
                           <m:sSubPr>
                             <m:ctrlPr>
                               <a:rPr lang="en-US" sz="2000" b="0" i="1" smtClean="0">
-                                <a:latin typeface="Cambria Math" panose="02040503050406030204" pitchFamily="18" charset="0"/>
+                                <a:latin typeface="Cambria Math" charset="0"/>
                                 <a:cs typeface="Arial" panose="020B0604020202020204" pitchFamily="34" charset="0"/>
                               </a:rPr>
                             </m:ctrlPr>
@@ -19062,7 +19063,7 @@
                                 <m:chr m:val="⃗"/>
                                 <m:ctrlPr>
                                   <a:rPr lang="en-US" sz="2000" b="0" i="1" smtClean="0">
-                                    <a:latin typeface="Cambria Math" panose="02040503050406030204" pitchFamily="18" charset="0"/>
+                                    <a:latin typeface="Cambria Math" charset="0"/>
                                     <a:cs typeface="Arial" panose="020B0604020202020204" pitchFamily="34" charset="0"/>
                                   </a:rPr>
                                 </m:ctrlPr>
@@ -19099,7 +19100,7 @@
               </p:txBody>
             </p:sp>
           </mc:Choice>
-          <mc:Fallback>
+          <mc:Fallback xmlns="">
             <p:sp>
               <p:nvSpPr>
                 <p:cNvPr id="41" name="TextBox 40"/>
@@ -19503,7 +19504,7 @@
                           <m:sSubPr>
                             <m:ctrlPr>
                               <a:rPr lang="en-US" sz="2000" b="0" i="1" smtClean="0">
-                                <a:latin typeface="Cambria Math" panose="02040503050406030204" pitchFamily="18" charset="0"/>
+                                <a:latin typeface="Cambria Math" charset="0"/>
                                 <a:cs typeface="Arial" panose="020B0604020202020204" pitchFamily="34" charset="0"/>
                               </a:rPr>
                             </m:ctrlPr>
@@ -19612,7 +19613,7 @@
                           <m:sSubPr>
                             <m:ctrlPr>
                               <a:rPr lang="en-US" sz="2000" b="0" i="1" smtClean="0">
-                                <a:latin typeface="Cambria Math" panose="02040503050406030204" pitchFamily="18" charset="0"/>
+                                <a:latin typeface="Cambria Math" charset="0"/>
                                 <a:cs typeface="Arial" panose="020B0604020202020204" pitchFamily="34" charset="0"/>
                               </a:rPr>
                             </m:ctrlPr>
@@ -19757,7 +19758,7 @@
                           <m:sSubPr>
                             <m:ctrlPr>
                               <a:rPr lang="en-US" sz="2000" b="0" i="1" smtClean="0">
-                                <a:latin typeface="Cambria Math" panose="02040503050406030204" pitchFamily="18" charset="0"/>
+                                <a:latin typeface="Cambria Math" charset="0"/>
                                 <a:cs typeface="Arial" panose="020B0604020202020204" pitchFamily="34" charset="0"/>
                               </a:rPr>
                             </m:ctrlPr>
@@ -19903,7 +19904,7 @@
                           <m:sSubPr>
                             <m:ctrlPr>
                               <a:rPr lang="en-US" sz="2000" b="0" i="1" smtClean="0">
-                                <a:latin typeface="Cambria Math" panose="02040503050406030204" pitchFamily="18" charset="0"/>
+                                <a:latin typeface="Cambria Math" charset="0"/>
                                 <a:cs typeface="Arial" panose="020B0604020202020204" pitchFamily="34" charset="0"/>
                               </a:rPr>
                             </m:ctrlPr>
@@ -19945,7 +19946,7 @@
                           <m:sSubPr>
                             <m:ctrlPr>
                               <a:rPr lang="en-US" sz="2000" b="0" i="1" smtClean="0">
-                                <a:latin typeface="Cambria Math" panose="02040503050406030204" pitchFamily="18" charset="0"/>
+                                <a:latin typeface="Cambria Math" charset="0"/>
                                 <a:cs typeface="Arial" panose="020B0604020202020204" pitchFamily="34" charset="0"/>
                               </a:rPr>
                             </m:ctrlPr>
@@ -20098,7 +20099,7 @@
                           <m:sSubPr>
                             <m:ctrlPr>
                               <a:rPr lang="en-US" sz="2000" b="0" i="1" smtClean="0">
-                                <a:latin typeface="Cambria Math" panose="02040503050406030204" pitchFamily="18" charset="0"/>
+                                <a:latin typeface="Cambria Math" charset="0"/>
                                 <a:cs typeface="Arial" panose="020B0604020202020204" pitchFamily="34" charset="0"/>
                               </a:rPr>
                             </m:ctrlPr>
@@ -20140,7 +20141,7 @@
                           <m:sSubPr>
                             <m:ctrlPr>
                               <a:rPr lang="en-US" sz="2000" b="0" i="1" smtClean="0">
-                                <a:latin typeface="Cambria Math" panose="02040503050406030204" pitchFamily="18" charset="0"/>
+                                <a:latin typeface="Cambria Math" charset="0"/>
                                 <a:cs typeface="Arial" panose="020B0604020202020204" pitchFamily="34" charset="0"/>
                               </a:rPr>
                             </m:ctrlPr>
@@ -20642,7 +20643,7 @@
                             <m:sSubPr>
                               <m:ctrlPr>
                                 <a:rPr lang="en-US" sz="2000" b="0" i="1" smtClean="0">
-                                  <a:latin typeface="Cambria Math" panose="02040503050406030204" pitchFamily="18" charset="0"/>
+                                  <a:latin typeface="Cambria Math" charset="0"/>
                                   <a:cs typeface="Arial" panose="020B0604020202020204" pitchFamily="34" charset="0"/>
                                 </a:rPr>
                               </m:ctrlPr>
@@ -20653,7 +20654,7 @@
                                   <m:chr m:val="⃗"/>
                                   <m:ctrlPr>
                                     <a:rPr lang="en-US" sz="2000" b="0" i="1" smtClean="0">
-                                      <a:latin typeface="Cambria Math" panose="02040503050406030204" pitchFamily="18" charset="0"/>
+                                      <a:latin typeface="Cambria Math" charset="0"/>
                                       <a:cs typeface="Arial" panose="020B0604020202020204" pitchFamily="34" charset="0"/>
                                     </a:rPr>
                                   </m:ctrlPr>
@@ -20765,7 +20766,7 @@
                               <m:chr m:val="⃗"/>
                               <m:ctrlPr>
                                 <a:rPr lang="en-US" sz="2000" b="0" i="1" smtClean="0">
-                                  <a:latin typeface="Cambria Math" panose="02040503050406030204" pitchFamily="18" charset="0"/>
+                                  <a:latin typeface="Cambria Math" charset="0"/>
                                   <a:cs typeface="Arial" panose="020B0604020202020204" pitchFamily="34" charset="0"/>
                                 </a:rPr>
                               </m:ctrlPr>
@@ -22131,7 +22132,7 @@
                             <m:sSubPr>
                               <m:ctrlPr>
                                 <a:rPr lang="en-US" sz="2000" b="0" i="1" smtClean="0">
-                                  <a:latin typeface="Cambria Math" panose="02040503050406030204" pitchFamily="18" charset="0"/>
+                                  <a:latin typeface="Cambria Math" charset="0"/>
                                   <a:cs typeface="Arial" panose="020B0604020202020204" pitchFamily="34" charset="0"/>
                                 </a:rPr>
                               </m:ctrlPr>
@@ -22142,7 +22143,7 @@
                                   <m:chr m:val="⃗"/>
                                   <m:ctrlPr>
                                     <a:rPr lang="en-US" sz="2000" b="0" i="1" smtClean="0">
-                                      <a:latin typeface="Cambria Math" panose="02040503050406030204" pitchFamily="18" charset="0"/>
+                                      <a:latin typeface="Cambria Math" charset="0"/>
                                       <a:cs typeface="Arial" panose="020B0604020202020204" pitchFamily="34" charset="0"/>
                                     </a:rPr>
                                   </m:ctrlPr>
@@ -22528,6 +22529,1551 @@
 </p:sld>
 </file>
 
+<file path=ppt/slides/slide6.xml><?xml version="1.0" encoding="utf-8"?>
+<p:sld xmlns:a="http://schemas.openxmlformats.org/drawingml/2006/main" xmlns:r="http://schemas.openxmlformats.org/officeDocument/2006/relationships" xmlns:p="http://schemas.openxmlformats.org/presentationml/2006/main">
+  <p:cSld>
+    <p:spTree>
+      <p:nvGrpSpPr>
+        <p:cNvPr id="1" name=""/>
+        <p:cNvGrpSpPr/>
+        <p:nvPr/>
+      </p:nvGrpSpPr>
+      <p:grpSpPr>
+        <a:xfrm>
+          <a:off x="0" y="0"/>
+          <a:ext cx="0" cy="0"/>
+          <a:chOff x="0" y="0"/>
+          <a:chExt cx="0" cy="0"/>
+        </a:xfrm>
+      </p:grpSpPr>
+      <p:grpSp>
+        <p:nvGrpSpPr>
+          <p:cNvPr id="61" name="Group 60"/>
+          <p:cNvGrpSpPr/>
+          <p:nvPr/>
+        </p:nvGrpSpPr>
+        <p:grpSpPr>
+          <a:xfrm>
+            <a:off x="2227947" y="405286"/>
+            <a:ext cx="3965198" cy="4922971"/>
+            <a:chOff x="2227947" y="405286"/>
+            <a:chExt cx="3965198" cy="4922971"/>
+          </a:xfrm>
+        </p:grpSpPr>
+        <p:grpSp>
+          <p:nvGrpSpPr>
+            <p:cNvPr id="44" name="Group 43"/>
+            <p:cNvGrpSpPr/>
+            <p:nvPr/>
+          </p:nvGrpSpPr>
+          <p:grpSpPr>
+            <a:xfrm>
+              <a:off x="2227947" y="634787"/>
+              <a:ext cx="3928471" cy="4323886"/>
+              <a:chOff x="2209093" y="634787"/>
+              <a:chExt cx="3928471" cy="4323886"/>
+            </a:xfrm>
+          </p:grpSpPr>
+          <p:sp>
+            <p:nvSpPr>
+              <p:cNvPr id="4" name="Oval 3"/>
+              <p:cNvSpPr/>
+              <p:nvPr/>
+            </p:nvSpPr>
+            <p:spPr>
+              <a:xfrm>
+                <a:off x="2881747" y="1011381"/>
+                <a:ext cx="2340000" cy="2340000"/>
+              </a:xfrm>
+              <a:prstGeom prst="ellipse">
+                <a:avLst/>
+              </a:prstGeom>
+              <a:noFill/>
+              <a:ln w="38100">
+                <a:solidFill>
+                  <a:schemeClr val="tx1"/>
+                </a:solidFill>
+              </a:ln>
+            </p:spPr>
+            <p:style>
+              <a:lnRef idx="2">
+                <a:schemeClr val="accent1">
+                  <a:shade val="50000"/>
+                </a:schemeClr>
+              </a:lnRef>
+              <a:fillRef idx="1">
+                <a:schemeClr val="accent1"/>
+              </a:fillRef>
+              <a:effectRef idx="0">
+                <a:schemeClr val="accent1"/>
+              </a:effectRef>
+              <a:fontRef idx="minor">
+                <a:schemeClr val="lt1"/>
+              </a:fontRef>
+            </p:style>
+            <p:txBody>
+              <a:bodyPr rtlCol="0" anchor="ctr"/>
+              <a:lstStyle/>
+              <a:p>
+                <a:pPr algn="ctr"/>
+                <a:endParaRPr lang="en-US"/>
+              </a:p>
+            </p:txBody>
+          </p:sp>
+          <p:sp>
+            <p:nvSpPr>
+              <p:cNvPr id="5" name="Oval 4"/>
+              <p:cNvSpPr/>
+              <p:nvPr/>
+            </p:nvSpPr>
+            <p:spPr>
+              <a:xfrm>
+                <a:off x="2735566" y="2032089"/>
+                <a:ext cx="288000" cy="288000"/>
+              </a:xfrm>
+              <a:prstGeom prst="ellipse">
+                <a:avLst/>
+              </a:prstGeom>
+              <a:solidFill>
+                <a:schemeClr val="accent1">
+                  <a:lumMod val="75000"/>
+                </a:schemeClr>
+              </a:solidFill>
+              <a:ln w="38100">
+                <a:solidFill>
+                  <a:schemeClr val="tx1"/>
+                </a:solidFill>
+              </a:ln>
+            </p:spPr>
+            <p:style>
+              <a:lnRef idx="2">
+                <a:schemeClr val="accent1">
+                  <a:shade val="50000"/>
+                </a:schemeClr>
+              </a:lnRef>
+              <a:fillRef idx="1">
+                <a:schemeClr val="accent1"/>
+              </a:fillRef>
+              <a:effectRef idx="0">
+                <a:schemeClr val="accent1"/>
+              </a:effectRef>
+              <a:fontRef idx="minor">
+                <a:schemeClr val="lt1"/>
+              </a:fontRef>
+            </p:style>
+            <p:txBody>
+              <a:bodyPr rtlCol="0" anchor="ctr"/>
+              <a:lstStyle/>
+              <a:p>
+                <a:pPr algn="ctr"/>
+                <a:endParaRPr lang="en-US"/>
+              </a:p>
+            </p:txBody>
+          </p:sp>
+          <p:sp>
+            <p:nvSpPr>
+              <p:cNvPr id="6" name="Oval 5"/>
+              <p:cNvSpPr/>
+              <p:nvPr/>
+            </p:nvSpPr>
+            <p:spPr>
+              <a:xfrm>
+                <a:off x="3048007" y="1247749"/>
+                <a:ext cx="288000" cy="288000"/>
+              </a:xfrm>
+              <a:prstGeom prst="ellipse">
+                <a:avLst/>
+              </a:prstGeom>
+              <a:solidFill>
+                <a:schemeClr val="accent1">
+                  <a:lumMod val="75000"/>
+                  <a:alpha val="80000"/>
+                </a:schemeClr>
+              </a:solidFill>
+              <a:ln w="38100">
+                <a:solidFill>
+                  <a:schemeClr val="tx1"/>
+                </a:solidFill>
+              </a:ln>
+            </p:spPr>
+            <p:style>
+              <a:lnRef idx="2">
+                <a:schemeClr val="accent1">
+                  <a:shade val="50000"/>
+                </a:schemeClr>
+              </a:lnRef>
+              <a:fillRef idx="1">
+                <a:schemeClr val="accent1"/>
+              </a:fillRef>
+              <a:effectRef idx="0">
+                <a:schemeClr val="accent1"/>
+              </a:effectRef>
+              <a:fontRef idx="minor">
+                <a:schemeClr val="lt1"/>
+              </a:fontRef>
+            </p:style>
+            <p:txBody>
+              <a:bodyPr rtlCol="0" anchor="ctr"/>
+              <a:lstStyle/>
+              <a:p>
+                <a:pPr algn="ctr"/>
+                <a:endParaRPr lang="en-US"/>
+              </a:p>
+            </p:txBody>
+          </p:sp>
+          <p:sp>
+            <p:nvSpPr>
+              <p:cNvPr id="7" name="Oval 6"/>
+              <p:cNvSpPr/>
+              <p:nvPr/>
+            </p:nvSpPr>
+            <p:spPr>
+              <a:xfrm>
+                <a:off x="3891711" y="862089"/>
+                <a:ext cx="288000" cy="288000"/>
+              </a:xfrm>
+              <a:prstGeom prst="ellipse">
+                <a:avLst/>
+              </a:prstGeom>
+              <a:solidFill>
+                <a:schemeClr val="accent1">
+                  <a:lumMod val="75000"/>
+                  <a:alpha val="60000"/>
+                </a:schemeClr>
+              </a:solidFill>
+              <a:ln w="38100">
+                <a:solidFill>
+                  <a:schemeClr val="tx1"/>
+                </a:solidFill>
+              </a:ln>
+            </p:spPr>
+            <p:style>
+              <a:lnRef idx="2">
+                <a:schemeClr val="accent1">
+                  <a:shade val="50000"/>
+                </a:schemeClr>
+              </a:lnRef>
+              <a:fillRef idx="1">
+                <a:schemeClr val="accent1"/>
+              </a:fillRef>
+              <a:effectRef idx="0">
+                <a:schemeClr val="accent1"/>
+              </a:effectRef>
+              <a:fontRef idx="minor">
+                <a:schemeClr val="lt1"/>
+              </a:fontRef>
+            </p:style>
+            <p:txBody>
+              <a:bodyPr rtlCol="0" anchor="ctr"/>
+              <a:lstStyle/>
+              <a:p>
+                <a:pPr algn="ctr"/>
+                <a:endParaRPr lang="en-US"/>
+              </a:p>
+            </p:txBody>
+          </p:sp>
+          <p:cxnSp>
+            <p:nvCxnSpPr>
+              <p:cNvPr id="10" name="Straight Connector 9"/>
+              <p:cNvCxnSpPr/>
+              <p:nvPr/>
+            </p:nvCxnSpPr>
+            <p:spPr>
+              <a:xfrm flipV="1">
+                <a:off x="2209093" y="4819124"/>
+                <a:ext cx="3928471" cy="0"/>
+              </a:xfrm>
+              <a:prstGeom prst="line">
+                <a:avLst/>
+              </a:prstGeom>
+              <a:ln w="38100">
+                <a:solidFill>
+                  <a:schemeClr val="tx1"/>
+                </a:solidFill>
+                <a:headEnd type="none" w="med" len="med"/>
+                <a:tailEnd type="triangle" w="med" len="med"/>
+              </a:ln>
+            </p:spPr>
+            <p:style>
+              <a:lnRef idx="1">
+                <a:schemeClr val="accent1"/>
+              </a:lnRef>
+              <a:fillRef idx="0">
+                <a:schemeClr val="accent1"/>
+              </a:fillRef>
+              <a:effectRef idx="0">
+                <a:schemeClr val="accent1"/>
+              </a:effectRef>
+              <a:fontRef idx="minor">
+                <a:schemeClr val="tx1"/>
+              </a:fontRef>
+            </p:style>
+          </p:cxnSp>
+          <p:sp>
+            <p:nvSpPr>
+              <p:cNvPr id="14" name="Oval 13"/>
+              <p:cNvSpPr/>
+              <p:nvPr/>
+            </p:nvSpPr>
+            <p:spPr>
+              <a:xfrm>
+                <a:off x="2735566" y="4670673"/>
+                <a:ext cx="288000" cy="288000"/>
+              </a:xfrm>
+              <a:prstGeom prst="ellipse">
+                <a:avLst/>
+              </a:prstGeom>
+              <a:solidFill>
+                <a:schemeClr val="accent1">
+                  <a:lumMod val="75000"/>
+                </a:schemeClr>
+              </a:solidFill>
+              <a:ln w="38100">
+                <a:solidFill>
+                  <a:schemeClr val="tx1"/>
+                </a:solidFill>
+              </a:ln>
+            </p:spPr>
+            <p:style>
+              <a:lnRef idx="2">
+                <a:schemeClr val="accent1">
+                  <a:shade val="50000"/>
+                </a:schemeClr>
+              </a:lnRef>
+              <a:fillRef idx="1">
+                <a:schemeClr val="accent1"/>
+              </a:fillRef>
+              <a:effectRef idx="0">
+                <a:schemeClr val="accent1"/>
+              </a:effectRef>
+              <a:fontRef idx="minor">
+                <a:schemeClr val="lt1"/>
+              </a:fontRef>
+            </p:style>
+            <p:txBody>
+              <a:bodyPr rtlCol="0" anchor="ctr"/>
+              <a:lstStyle/>
+              <a:p>
+                <a:pPr algn="ctr"/>
+                <a:endParaRPr lang="en-US"/>
+              </a:p>
+            </p:txBody>
+          </p:sp>
+          <p:sp>
+            <p:nvSpPr>
+              <p:cNvPr id="16" name="Oval 15"/>
+              <p:cNvSpPr/>
+              <p:nvPr/>
+            </p:nvSpPr>
+            <p:spPr>
+              <a:xfrm>
+                <a:off x="3891711" y="4664463"/>
+                <a:ext cx="288000" cy="288000"/>
+              </a:xfrm>
+              <a:prstGeom prst="ellipse">
+                <a:avLst/>
+              </a:prstGeom>
+              <a:solidFill>
+                <a:schemeClr val="accent1">
+                  <a:lumMod val="75000"/>
+                  <a:alpha val="60000"/>
+                </a:schemeClr>
+              </a:solidFill>
+              <a:ln w="38100">
+                <a:solidFill>
+                  <a:schemeClr val="tx1"/>
+                </a:solidFill>
+              </a:ln>
+            </p:spPr>
+            <p:style>
+              <a:lnRef idx="2">
+                <a:schemeClr val="accent1">
+                  <a:shade val="50000"/>
+                </a:schemeClr>
+              </a:lnRef>
+              <a:fillRef idx="1">
+                <a:schemeClr val="accent1"/>
+              </a:fillRef>
+              <a:effectRef idx="0">
+                <a:schemeClr val="accent1"/>
+              </a:effectRef>
+              <a:fontRef idx="minor">
+                <a:schemeClr val="lt1"/>
+              </a:fontRef>
+            </p:style>
+            <p:txBody>
+              <a:bodyPr rtlCol="0" anchor="ctr"/>
+              <a:lstStyle/>
+              <a:p>
+                <a:pPr algn="ctr"/>
+                <a:endParaRPr lang="en-US"/>
+              </a:p>
+            </p:txBody>
+          </p:sp>
+          <p:sp>
+            <p:nvSpPr>
+              <p:cNvPr id="17" name="Oval 16"/>
+              <p:cNvSpPr/>
+              <p:nvPr/>
+            </p:nvSpPr>
+            <p:spPr>
+              <a:xfrm>
+                <a:off x="3048002" y="4669833"/>
+                <a:ext cx="288000" cy="288000"/>
+              </a:xfrm>
+              <a:prstGeom prst="ellipse">
+                <a:avLst/>
+              </a:prstGeom>
+              <a:solidFill>
+                <a:schemeClr val="accent1">
+                  <a:lumMod val="75000"/>
+                  <a:alpha val="80000"/>
+                </a:schemeClr>
+              </a:solidFill>
+              <a:ln w="38100">
+                <a:solidFill>
+                  <a:schemeClr val="tx1"/>
+                </a:solidFill>
+              </a:ln>
+            </p:spPr>
+            <p:style>
+              <a:lnRef idx="2">
+                <a:schemeClr val="accent1">
+                  <a:shade val="50000"/>
+                </a:schemeClr>
+              </a:lnRef>
+              <a:fillRef idx="1">
+                <a:schemeClr val="accent1"/>
+              </a:fillRef>
+              <a:effectRef idx="0">
+                <a:schemeClr val="accent1"/>
+              </a:effectRef>
+              <a:fontRef idx="minor">
+                <a:schemeClr val="lt1"/>
+              </a:fontRef>
+            </p:style>
+            <p:txBody>
+              <a:bodyPr rtlCol="0" anchor="ctr"/>
+              <a:lstStyle/>
+              <a:p>
+                <a:pPr algn="ctr"/>
+                <a:endParaRPr lang="en-US"/>
+              </a:p>
+            </p:txBody>
+          </p:sp>
+          <p:cxnSp>
+            <p:nvCxnSpPr>
+              <p:cNvPr id="21" name="Straight Connector 20"/>
+              <p:cNvCxnSpPr>
+                <a:endCxn id="14" idx="0"/>
+              </p:cNvCxnSpPr>
+              <p:nvPr/>
+            </p:nvCxnSpPr>
+            <p:spPr>
+              <a:xfrm>
+                <a:off x="2879566" y="2320089"/>
+                <a:ext cx="0" cy="2350584"/>
+              </a:xfrm>
+              <a:prstGeom prst="line">
+                <a:avLst/>
+              </a:prstGeom>
+              <a:ln w="28575">
+                <a:solidFill>
+                  <a:schemeClr val="tx1"/>
+                </a:solidFill>
+                <a:prstDash val="dash"/>
+              </a:ln>
+            </p:spPr>
+            <p:style>
+              <a:lnRef idx="1">
+                <a:schemeClr val="accent1"/>
+              </a:lnRef>
+              <a:fillRef idx="0">
+                <a:schemeClr val="accent1"/>
+              </a:fillRef>
+              <a:effectRef idx="0">
+                <a:schemeClr val="accent1"/>
+              </a:effectRef>
+              <a:fontRef idx="minor">
+                <a:schemeClr val="tx1"/>
+              </a:fontRef>
+            </p:style>
+          </p:cxnSp>
+          <p:cxnSp>
+            <p:nvCxnSpPr>
+              <p:cNvPr id="22" name="Straight Connector 21"/>
+              <p:cNvCxnSpPr>
+                <a:stCxn id="6" idx="4"/>
+                <a:endCxn id="17" idx="0"/>
+              </p:cNvCxnSpPr>
+              <p:nvPr/>
+            </p:nvCxnSpPr>
+            <p:spPr>
+              <a:xfrm flipH="1">
+                <a:off x="3192002" y="1535749"/>
+                <a:ext cx="5" cy="3134084"/>
+              </a:xfrm>
+              <a:prstGeom prst="line">
+                <a:avLst/>
+              </a:prstGeom>
+              <a:ln w="28575">
+                <a:solidFill>
+                  <a:schemeClr val="tx1"/>
+                </a:solidFill>
+                <a:prstDash val="dash"/>
+              </a:ln>
+            </p:spPr>
+            <p:style>
+              <a:lnRef idx="1">
+                <a:schemeClr val="accent1"/>
+              </a:lnRef>
+              <a:fillRef idx="0">
+                <a:schemeClr val="accent1"/>
+              </a:fillRef>
+              <a:effectRef idx="0">
+                <a:schemeClr val="accent1"/>
+              </a:effectRef>
+              <a:fontRef idx="minor">
+                <a:schemeClr val="tx1"/>
+              </a:fontRef>
+            </p:style>
+          </p:cxnSp>
+          <p:cxnSp>
+            <p:nvCxnSpPr>
+              <p:cNvPr id="24" name="Straight Connector 23"/>
+              <p:cNvCxnSpPr>
+                <a:stCxn id="7" idx="4"/>
+                <a:endCxn id="16" idx="0"/>
+              </p:cNvCxnSpPr>
+              <p:nvPr/>
+            </p:nvCxnSpPr>
+            <p:spPr>
+              <a:xfrm>
+                <a:off x="4035711" y="1150089"/>
+                <a:ext cx="0" cy="3514374"/>
+              </a:xfrm>
+              <a:prstGeom prst="line">
+                <a:avLst/>
+              </a:prstGeom>
+              <a:ln w="28575">
+                <a:solidFill>
+                  <a:schemeClr val="tx1"/>
+                </a:solidFill>
+                <a:prstDash val="dash"/>
+              </a:ln>
+            </p:spPr>
+            <p:style>
+              <a:lnRef idx="1">
+                <a:schemeClr val="accent1"/>
+              </a:lnRef>
+              <a:fillRef idx="0">
+                <a:schemeClr val="accent1"/>
+              </a:fillRef>
+              <a:effectRef idx="0">
+                <a:schemeClr val="accent1"/>
+              </a:effectRef>
+              <a:fontRef idx="minor">
+                <a:schemeClr val="tx1"/>
+              </a:fontRef>
+            </p:style>
+          </p:cxnSp>
+          <p:sp>
+            <p:nvSpPr>
+              <p:cNvPr id="27" name="Oval 26"/>
+              <p:cNvSpPr/>
+              <p:nvPr/>
+            </p:nvSpPr>
+            <p:spPr>
+              <a:xfrm>
+                <a:off x="5065527" y="2032089"/>
+                <a:ext cx="272336" cy="288000"/>
+              </a:xfrm>
+              <a:prstGeom prst="ellipse">
+                <a:avLst/>
+              </a:prstGeom>
+              <a:solidFill>
+                <a:schemeClr val="accent1">
+                  <a:lumMod val="75000"/>
+                  <a:alpha val="20000"/>
+                </a:schemeClr>
+              </a:solidFill>
+              <a:ln w="38100">
+                <a:solidFill>
+                  <a:schemeClr val="tx1"/>
+                </a:solidFill>
+              </a:ln>
+            </p:spPr>
+            <p:style>
+              <a:lnRef idx="2">
+                <a:schemeClr val="accent1">
+                  <a:shade val="50000"/>
+                </a:schemeClr>
+              </a:lnRef>
+              <a:fillRef idx="1">
+                <a:schemeClr val="accent1"/>
+              </a:fillRef>
+              <a:effectRef idx="0">
+                <a:schemeClr val="accent1"/>
+              </a:effectRef>
+              <a:fontRef idx="minor">
+                <a:schemeClr val="lt1"/>
+              </a:fontRef>
+            </p:style>
+            <p:txBody>
+              <a:bodyPr rtlCol="0" anchor="ctr"/>
+              <a:lstStyle/>
+              <a:p>
+                <a:pPr algn="ctr"/>
+                <a:endParaRPr lang="en-US"/>
+              </a:p>
+            </p:txBody>
+          </p:sp>
+          <p:sp>
+            <p:nvSpPr>
+              <p:cNvPr id="28" name="Oval 27"/>
+              <p:cNvSpPr/>
+              <p:nvPr/>
+            </p:nvSpPr>
+            <p:spPr>
+              <a:xfrm>
+                <a:off x="4777527" y="1247749"/>
+                <a:ext cx="288000" cy="288000"/>
+              </a:xfrm>
+              <a:prstGeom prst="ellipse">
+                <a:avLst/>
+              </a:prstGeom>
+              <a:solidFill>
+                <a:schemeClr val="accent1">
+                  <a:lumMod val="75000"/>
+                  <a:alpha val="40000"/>
+                </a:schemeClr>
+              </a:solidFill>
+              <a:ln w="38100">
+                <a:solidFill>
+                  <a:schemeClr val="tx1"/>
+                </a:solidFill>
+              </a:ln>
+            </p:spPr>
+            <p:style>
+              <a:lnRef idx="2">
+                <a:schemeClr val="accent1">
+                  <a:shade val="50000"/>
+                </a:schemeClr>
+              </a:lnRef>
+              <a:fillRef idx="1">
+                <a:schemeClr val="accent1"/>
+              </a:fillRef>
+              <a:effectRef idx="0">
+                <a:schemeClr val="accent1"/>
+              </a:effectRef>
+              <a:fontRef idx="minor">
+                <a:schemeClr val="lt1"/>
+              </a:fontRef>
+            </p:style>
+            <p:txBody>
+              <a:bodyPr rtlCol="0" anchor="ctr"/>
+              <a:lstStyle/>
+              <a:p>
+                <a:pPr algn="ctr"/>
+                <a:endParaRPr lang="en-US"/>
+              </a:p>
+            </p:txBody>
+          </p:sp>
+          <p:sp>
+            <p:nvSpPr>
+              <p:cNvPr id="29" name="Oval 28"/>
+              <p:cNvSpPr/>
+              <p:nvPr/>
+            </p:nvSpPr>
+            <p:spPr>
+              <a:xfrm>
+                <a:off x="5065527" y="4665559"/>
+                <a:ext cx="288000" cy="288000"/>
+              </a:xfrm>
+              <a:prstGeom prst="ellipse">
+                <a:avLst/>
+              </a:prstGeom>
+              <a:solidFill>
+                <a:schemeClr val="accent1">
+                  <a:lumMod val="75000"/>
+                  <a:alpha val="20000"/>
+                </a:schemeClr>
+              </a:solidFill>
+              <a:ln w="38100">
+                <a:solidFill>
+                  <a:schemeClr val="tx1"/>
+                </a:solidFill>
+              </a:ln>
+            </p:spPr>
+            <p:style>
+              <a:lnRef idx="2">
+                <a:schemeClr val="accent1">
+                  <a:shade val="50000"/>
+                </a:schemeClr>
+              </a:lnRef>
+              <a:fillRef idx="1">
+                <a:schemeClr val="accent1"/>
+              </a:fillRef>
+              <a:effectRef idx="0">
+                <a:schemeClr val="accent1"/>
+              </a:effectRef>
+              <a:fontRef idx="minor">
+                <a:schemeClr val="lt1"/>
+              </a:fontRef>
+            </p:style>
+            <p:txBody>
+              <a:bodyPr rtlCol="0" anchor="ctr"/>
+              <a:lstStyle/>
+              <a:p>
+                <a:pPr algn="ctr"/>
+                <a:endParaRPr lang="en-US"/>
+              </a:p>
+            </p:txBody>
+          </p:sp>
+          <p:sp>
+            <p:nvSpPr>
+              <p:cNvPr id="30" name="Oval 29"/>
+              <p:cNvSpPr/>
+              <p:nvPr/>
+            </p:nvSpPr>
+            <p:spPr>
+              <a:xfrm>
+                <a:off x="4777527" y="4665559"/>
+                <a:ext cx="288000" cy="288000"/>
+              </a:xfrm>
+              <a:prstGeom prst="ellipse">
+                <a:avLst/>
+              </a:prstGeom>
+              <a:solidFill>
+                <a:schemeClr val="accent1">
+                  <a:lumMod val="75000"/>
+                  <a:alpha val="40000"/>
+                </a:schemeClr>
+              </a:solidFill>
+              <a:ln w="38100">
+                <a:solidFill>
+                  <a:schemeClr val="tx1"/>
+                </a:solidFill>
+              </a:ln>
+            </p:spPr>
+            <p:style>
+              <a:lnRef idx="2">
+                <a:schemeClr val="accent1">
+                  <a:shade val="50000"/>
+                </a:schemeClr>
+              </a:lnRef>
+              <a:fillRef idx="1">
+                <a:schemeClr val="accent1"/>
+              </a:fillRef>
+              <a:effectRef idx="0">
+                <a:schemeClr val="accent1"/>
+              </a:effectRef>
+              <a:fontRef idx="minor">
+                <a:schemeClr val="lt1"/>
+              </a:fontRef>
+            </p:style>
+            <p:txBody>
+              <a:bodyPr rtlCol="0" anchor="ctr"/>
+              <a:lstStyle/>
+              <a:p>
+                <a:pPr algn="ctr"/>
+                <a:endParaRPr lang="en-US"/>
+              </a:p>
+            </p:txBody>
+          </p:sp>
+          <p:cxnSp>
+            <p:nvCxnSpPr>
+              <p:cNvPr id="31" name="Straight Connector 30"/>
+              <p:cNvCxnSpPr>
+                <a:stCxn id="27" idx="4"/>
+                <a:endCxn id="29" idx="0"/>
+              </p:cNvCxnSpPr>
+              <p:nvPr/>
+            </p:nvCxnSpPr>
+            <p:spPr>
+              <a:xfrm>
+                <a:off x="5201695" y="2320089"/>
+                <a:ext cx="7832" cy="2345470"/>
+              </a:xfrm>
+              <a:prstGeom prst="line">
+                <a:avLst/>
+              </a:prstGeom>
+              <a:ln w="28575">
+                <a:solidFill>
+                  <a:schemeClr val="tx1"/>
+                </a:solidFill>
+                <a:prstDash val="dash"/>
+              </a:ln>
+            </p:spPr>
+            <p:style>
+              <a:lnRef idx="1">
+                <a:schemeClr val="accent1"/>
+              </a:lnRef>
+              <a:fillRef idx="0">
+                <a:schemeClr val="accent1"/>
+              </a:fillRef>
+              <a:effectRef idx="0">
+                <a:schemeClr val="accent1"/>
+              </a:effectRef>
+              <a:fontRef idx="minor">
+                <a:schemeClr val="tx1"/>
+              </a:fontRef>
+            </p:style>
+          </p:cxnSp>
+          <p:cxnSp>
+            <p:nvCxnSpPr>
+              <p:cNvPr id="32" name="Straight Connector 31"/>
+              <p:cNvCxnSpPr>
+                <a:stCxn id="28" idx="4"/>
+                <a:endCxn id="30" idx="0"/>
+              </p:cNvCxnSpPr>
+              <p:nvPr/>
+            </p:nvCxnSpPr>
+            <p:spPr>
+              <a:xfrm>
+                <a:off x="4921527" y="1535749"/>
+                <a:ext cx="0" cy="3129810"/>
+              </a:xfrm>
+              <a:prstGeom prst="line">
+                <a:avLst/>
+              </a:prstGeom>
+              <a:ln w="28575">
+                <a:solidFill>
+                  <a:schemeClr val="tx1"/>
+                </a:solidFill>
+                <a:prstDash val="dash"/>
+              </a:ln>
+            </p:spPr>
+            <p:style>
+              <a:lnRef idx="1">
+                <a:schemeClr val="accent1"/>
+              </a:lnRef>
+              <a:fillRef idx="0">
+                <a:schemeClr val="accent1"/>
+              </a:fillRef>
+              <a:effectRef idx="0">
+                <a:schemeClr val="accent1"/>
+              </a:effectRef>
+              <a:fontRef idx="minor">
+                <a:schemeClr val="tx1"/>
+              </a:fontRef>
+            </p:style>
+          </p:cxnSp>
+          <p:sp>
+            <p:nvSpPr>
+              <p:cNvPr id="43" name="Arc 42"/>
+              <p:cNvSpPr/>
+              <p:nvPr/>
+            </p:nvSpPr>
+            <p:spPr>
+              <a:xfrm rot="16200000">
+                <a:off x="2426392" y="634787"/>
+                <a:ext cx="2880000" cy="2880000"/>
+              </a:xfrm>
+              <a:prstGeom prst="arc">
+                <a:avLst>
+                  <a:gd name="adj1" fmla="val 16200000"/>
+                  <a:gd name="adj2" fmla="val 18024115"/>
+                </a:avLst>
+              </a:prstGeom>
+              <a:ln w="38100">
+                <a:solidFill>
+                  <a:schemeClr val="tx1"/>
+                </a:solidFill>
+                <a:headEnd type="none" w="med" len="med"/>
+                <a:tailEnd type="triangle" w="med" len="med"/>
+              </a:ln>
+            </p:spPr>
+            <p:style>
+              <a:lnRef idx="1">
+                <a:schemeClr val="accent1"/>
+              </a:lnRef>
+              <a:fillRef idx="0">
+                <a:schemeClr val="accent1"/>
+              </a:fillRef>
+              <a:effectRef idx="0">
+                <a:schemeClr val="accent1"/>
+              </a:effectRef>
+              <a:fontRef idx="minor">
+                <a:schemeClr val="tx1"/>
+              </a:fontRef>
+            </p:style>
+            <p:txBody>
+              <a:bodyPr rtlCol="0" anchor="ctr"/>
+              <a:lstStyle/>
+              <a:p>
+                <a:pPr algn="ctr"/>
+                <a:endParaRPr lang="en-US"/>
+              </a:p>
+            </p:txBody>
+          </p:sp>
+        </p:grpSp>
+        <mc:AlternateContent xmlns:mc="http://schemas.openxmlformats.org/markup-compatibility/2006">
+          <mc:Choice xmlns:a14="http://schemas.microsoft.com/office/drawing/2010/main" Requires="a14">
+            <p:sp>
+              <p:nvSpPr>
+                <p:cNvPr id="45" name="TextBox 44"/>
+                <p:cNvSpPr txBox="1"/>
+                <p:nvPr/>
+              </p:nvSpPr>
+              <p:spPr>
+                <a:xfrm>
+                  <a:off x="5978599" y="4819124"/>
+                  <a:ext cx="214546" cy="307777"/>
+                </a:xfrm>
+                <a:prstGeom prst="rect">
+                  <a:avLst/>
+                </a:prstGeom>
+                <a:noFill/>
+              </p:spPr>
+              <p:txBody>
+                <a:bodyPr wrap="none" lIns="0" tIns="0" rIns="0" bIns="0" rtlCol="0">
+                  <a:spAutoFit/>
+                </a:bodyPr>
+                <a:lstStyle/>
+                <a:p>
+                  <a14:m>
+                    <m:oMathPara xmlns:m="http://schemas.openxmlformats.org/officeDocument/2006/math">
+                      <m:oMathParaPr>
+                        <m:jc m:val="centerGroup"/>
+                      </m:oMathParaPr>
+                      <m:oMath xmlns:m="http://schemas.openxmlformats.org/officeDocument/2006/math">
+                        <m:r>
+                          <a:rPr lang="en-CA" sz="2000" b="0" i="1" smtClean="0">
+                            <a:latin typeface="Cambria Math" charset="0"/>
+                            <a:cs typeface="Arial" panose="020B0604020202020204" pitchFamily="34" charset="0"/>
+                          </a:rPr>
+                          <m:t>𝑥</m:t>
+                        </m:r>
+                      </m:oMath>
+                    </m:oMathPara>
+                  </a14:m>
+                  <a:endParaRPr lang="en-US" sz="2000" dirty="0" smtClean="0">
+                    <a:latin typeface="Arial" panose="020B0604020202020204" pitchFamily="34" charset="0"/>
+                    <a:cs typeface="Arial" panose="020B0604020202020204" pitchFamily="34" charset="0"/>
+                  </a:endParaRPr>
+                </a:p>
+              </p:txBody>
+            </p:sp>
+          </mc:Choice>
+          <mc:Fallback>
+            <p:sp>
+              <p:nvSpPr>
+                <p:cNvPr id="45" name="TextBox 44"/>
+                <p:cNvSpPr txBox="1">
+                  <a:spLocks noRot="1" noChangeAspect="1" noMove="1" noResize="1" noEditPoints="1" noAdjustHandles="1" noChangeArrowheads="1" noChangeShapeType="1" noTextEdit="1"/>
+                </p:cNvSpPr>
+                <p:nvPr/>
+              </p:nvSpPr>
+              <p:spPr>
+                <a:xfrm>
+                  <a:off x="5978599" y="4819124"/>
+                  <a:ext cx="214546" cy="307777"/>
+                </a:xfrm>
+                <a:prstGeom prst="rect">
+                  <a:avLst/>
+                </a:prstGeom>
+                <a:blipFill rotWithShape="0">
+                  <a:blip r:embed="rId2"/>
+                  <a:stretch>
+                    <a:fillRect l="-14286" r="-8571" b="-2000"/>
+                  </a:stretch>
+                </a:blipFill>
+              </p:spPr>
+              <p:txBody>
+                <a:bodyPr/>
+                <a:lstStyle/>
+                <a:p>
+                  <a:r>
+                    <a:rPr lang="en-US">
+                      <a:noFill/>
+                    </a:rPr>
+                    <a:t> </a:t>
+                  </a:r>
+                </a:p>
+              </p:txBody>
+            </p:sp>
+          </mc:Fallback>
+        </mc:AlternateContent>
+        <mc:AlternateContent xmlns:mc="http://schemas.openxmlformats.org/markup-compatibility/2006">
+          <mc:Choice xmlns:a14="http://schemas.microsoft.com/office/drawing/2010/main" Requires="a14">
+            <p:sp>
+              <p:nvSpPr>
+                <p:cNvPr id="46" name="TextBox 45"/>
+                <p:cNvSpPr txBox="1"/>
+                <p:nvPr/>
+              </p:nvSpPr>
+              <p:spPr>
+                <a:xfrm>
+                  <a:off x="3947292" y="5020480"/>
+                  <a:ext cx="213199" cy="307777"/>
+                </a:xfrm>
+                <a:prstGeom prst="rect">
+                  <a:avLst/>
+                </a:prstGeom>
+                <a:noFill/>
+              </p:spPr>
+              <p:txBody>
+                <a:bodyPr wrap="none" lIns="0" tIns="0" rIns="0" bIns="0" rtlCol="0">
+                  <a:spAutoFit/>
+                </a:bodyPr>
+                <a:lstStyle/>
+                <a:p>
+                  <a14:m>
+                    <m:oMathPara xmlns:m="http://schemas.openxmlformats.org/officeDocument/2006/math">
+                      <m:oMathParaPr>
+                        <m:jc m:val="centerGroup"/>
+                      </m:oMathParaPr>
+                      <m:oMath xmlns:m="http://schemas.openxmlformats.org/officeDocument/2006/math">
+                        <m:r>
+                          <a:rPr lang="en-CA" sz="2000" b="0" i="1" smtClean="0">
+                            <a:latin typeface="Cambria Math" charset="0"/>
+                            <a:cs typeface="Arial" panose="020B0604020202020204" pitchFamily="34" charset="0"/>
+                          </a:rPr>
+                          <m:t>0</m:t>
+                        </m:r>
+                      </m:oMath>
+                    </m:oMathPara>
+                  </a14:m>
+                  <a:endParaRPr lang="en-US" sz="2000" dirty="0" smtClean="0">
+                    <a:latin typeface="Arial" panose="020B0604020202020204" pitchFamily="34" charset="0"/>
+                    <a:cs typeface="Arial" panose="020B0604020202020204" pitchFamily="34" charset="0"/>
+                  </a:endParaRPr>
+                </a:p>
+              </p:txBody>
+            </p:sp>
+          </mc:Choice>
+          <mc:Fallback>
+            <p:sp>
+              <p:nvSpPr>
+                <p:cNvPr id="46" name="TextBox 45"/>
+                <p:cNvSpPr txBox="1">
+                  <a:spLocks noRot="1" noChangeAspect="1" noMove="1" noResize="1" noEditPoints="1" noAdjustHandles="1" noChangeArrowheads="1" noChangeShapeType="1" noTextEdit="1"/>
+                </p:cNvSpPr>
+                <p:nvPr/>
+              </p:nvSpPr>
+              <p:spPr>
+                <a:xfrm>
+                  <a:off x="3947292" y="5020480"/>
+                  <a:ext cx="213199" cy="307777"/>
+                </a:xfrm>
+                <a:prstGeom prst="rect">
+                  <a:avLst/>
+                </a:prstGeom>
+                <a:blipFill rotWithShape="0">
+                  <a:blip r:embed="rId3"/>
+                  <a:stretch>
+                    <a:fillRect l="-26471" r="-29412" b="-14000"/>
+                  </a:stretch>
+                </a:blipFill>
+              </p:spPr>
+              <p:txBody>
+                <a:bodyPr/>
+                <a:lstStyle/>
+                <a:p>
+                  <a:r>
+                    <a:rPr lang="en-US">
+                      <a:noFill/>
+                    </a:rPr>
+                    <a:t> </a:t>
+                  </a:r>
+                </a:p>
+              </p:txBody>
+            </p:sp>
+          </mc:Fallback>
+        </mc:AlternateContent>
+        <mc:AlternateContent xmlns:mc="http://schemas.openxmlformats.org/markup-compatibility/2006">
+          <mc:Choice xmlns:a14="http://schemas.microsoft.com/office/drawing/2010/main" Requires="a14">
+            <p:sp>
+              <p:nvSpPr>
+                <p:cNvPr id="47" name="TextBox 46"/>
+                <p:cNvSpPr txBox="1"/>
+                <p:nvPr/>
+              </p:nvSpPr>
+              <p:spPr>
+                <a:xfrm>
+                  <a:off x="5110913" y="5020480"/>
+                  <a:ext cx="234936" cy="307777"/>
+                </a:xfrm>
+                <a:prstGeom prst="rect">
+                  <a:avLst/>
+                </a:prstGeom>
+                <a:noFill/>
+              </p:spPr>
+              <p:txBody>
+                <a:bodyPr wrap="none" lIns="0" tIns="0" rIns="0" bIns="0" rtlCol="0">
+                  <a:spAutoFit/>
+                </a:bodyPr>
+                <a:lstStyle/>
+                <a:p>
+                  <a14:m>
+                    <m:oMathPara xmlns:m="http://schemas.openxmlformats.org/officeDocument/2006/math">
+                      <m:oMathParaPr>
+                        <m:jc m:val="centerGroup"/>
+                      </m:oMathParaPr>
+                      <m:oMath xmlns:m="http://schemas.openxmlformats.org/officeDocument/2006/math">
+                        <m:r>
+                          <a:rPr lang="en-CA" sz="2000" b="0" i="1" smtClean="0">
+                            <a:latin typeface="Cambria Math" charset="0"/>
+                            <a:cs typeface="Arial" panose="020B0604020202020204" pitchFamily="34" charset="0"/>
+                          </a:rPr>
+                          <m:t>𝐴</m:t>
+                        </m:r>
+                      </m:oMath>
+                    </m:oMathPara>
+                  </a14:m>
+                  <a:endParaRPr lang="en-US" sz="2000" dirty="0" smtClean="0">
+                    <a:latin typeface="Arial" panose="020B0604020202020204" pitchFamily="34" charset="0"/>
+                    <a:cs typeface="Arial" panose="020B0604020202020204" pitchFamily="34" charset="0"/>
+                  </a:endParaRPr>
+                </a:p>
+              </p:txBody>
+            </p:sp>
+          </mc:Choice>
+          <mc:Fallback>
+            <p:sp>
+              <p:nvSpPr>
+                <p:cNvPr id="47" name="TextBox 46"/>
+                <p:cNvSpPr txBox="1">
+                  <a:spLocks noRot="1" noChangeAspect="1" noMove="1" noResize="1" noEditPoints="1" noAdjustHandles="1" noChangeArrowheads="1" noChangeShapeType="1" noTextEdit="1"/>
+                </p:cNvSpPr>
+                <p:nvPr/>
+              </p:nvSpPr>
+              <p:spPr>
+                <a:xfrm>
+                  <a:off x="5110913" y="5020480"/>
+                  <a:ext cx="234936" cy="307777"/>
+                </a:xfrm>
+                <a:prstGeom prst="rect">
+                  <a:avLst/>
+                </a:prstGeom>
+                <a:blipFill rotWithShape="0">
+                  <a:blip r:embed="rId4"/>
+                  <a:stretch>
+                    <a:fillRect l="-20513" r="-23077" b="-10000"/>
+                  </a:stretch>
+                </a:blipFill>
+              </p:spPr>
+              <p:txBody>
+                <a:bodyPr/>
+                <a:lstStyle/>
+                <a:p>
+                  <a:r>
+                    <a:rPr lang="en-US">
+                      <a:noFill/>
+                    </a:rPr>
+                    <a:t> </a:t>
+                  </a:r>
+                </a:p>
+              </p:txBody>
+            </p:sp>
+          </mc:Fallback>
+        </mc:AlternateContent>
+        <mc:AlternateContent xmlns:mc="http://schemas.openxmlformats.org/markup-compatibility/2006">
+          <mc:Choice xmlns:a14="http://schemas.microsoft.com/office/drawing/2010/main" Requires="a14">
+            <p:sp>
+              <p:nvSpPr>
+                <p:cNvPr id="48" name="TextBox 47"/>
+                <p:cNvSpPr txBox="1"/>
+                <p:nvPr/>
+              </p:nvSpPr>
+              <p:spPr>
+                <a:xfrm>
+                  <a:off x="2558706" y="4991544"/>
+                  <a:ext cx="427296" cy="307777"/>
+                </a:xfrm>
+                <a:prstGeom prst="rect">
+                  <a:avLst/>
+                </a:prstGeom>
+                <a:noFill/>
+              </p:spPr>
+              <p:txBody>
+                <a:bodyPr wrap="none" lIns="0" tIns="0" rIns="0" bIns="0" rtlCol="0">
+                  <a:spAutoFit/>
+                </a:bodyPr>
+                <a:lstStyle/>
+                <a:p>
+                  <a14:m>
+                    <m:oMathPara xmlns:m="http://schemas.openxmlformats.org/officeDocument/2006/math">
+                      <m:oMathParaPr>
+                        <m:jc m:val="centerGroup"/>
+                      </m:oMathParaPr>
+                      <m:oMath xmlns:m="http://schemas.openxmlformats.org/officeDocument/2006/math">
+                        <m:r>
+                          <a:rPr lang="en-CA" sz="2000" b="0" i="1" smtClean="0">
+                            <a:latin typeface="Cambria Math" charset="0"/>
+                            <a:cs typeface="Arial" panose="020B0604020202020204" pitchFamily="34" charset="0"/>
+                          </a:rPr>
+                          <m:t>−</m:t>
+                        </m:r>
+                        <m:r>
+                          <a:rPr lang="en-CA" sz="2000" b="0" i="1" smtClean="0">
+                            <a:latin typeface="Cambria Math" charset="0"/>
+                            <a:cs typeface="Arial" panose="020B0604020202020204" pitchFamily="34" charset="0"/>
+                          </a:rPr>
+                          <m:t>𝐴</m:t>
+                        </m:r>
+                      </m:oMath>
+                    </m:oMathPara>
+                  </a14:m>
+                  <a:endParaRPr lang="en-US" sz="2000" dirty="0" smtClean="0">
+                    <a:latin typeface="Arial" panose="020B0604020202020204" pitchFamily="34" charset="0"/>
+                    <a:cs typeface="Arial" panose="020B0604020202020204" pitchFamily="34" charset="0"/>
+                  </a:endParaRPr>
+                </a:p>
+              </p:txBody>
+            </p:sp>
+          </mc:Choice>
+          <mc:Fallback>
+            <p:sp>
+              <p:nvSpPr>
+                <p:cNvPr id="48" name="TextBox 47"/>
+                <p:cNvSpPr txBox="1">
+                  <a:spLocks noRot="1" noChangeAspect="1" noMove="1" noResize="1" noEditPoints="1" noAdjustHandles="1" noChangeArrowheads="1" noChangeShapeType="1" noTextEdit="1"/>
+                </p:cNvSpPr>
+                <p:nvPr/>
+              </p:nvSpPr>
+              <p:spPr>
+                <a:xfrm>
+                  <a:off x="2558706" y="4991544"/>
+                  <a:ext cx="427296" cy="307777"/>
+                </a:xfrm>
+                <a:prstGeom prst="rect">
+                  <a:avLst/>
+                </a:prstGeom>
+                <a:blipFill rotWithShape="0">
+                  <a:blip r:embed="rId5"/>
+                  <a:stretch>
+                    <a:fillRect l="-1429" r="-11429" b="-10000"/>
+                  </a:stretch>
+                </a:blipFill>
+              </p:spPr>
+              <p:txBody>
+                <a:bodyPr/>
+                <a:lstStyle/>
+                <a:p>
+                  <a:r>
+                    <a:rPr lang="en-US">
+                      <a:noFill/>
+                    </a:rPr>
+                    <a:t> </a:t>
+                  </a:r>
+                </a:p>
+              </p:txBody>
+            </p:sp>
+          </mc:Fallback>
+        </mc:AlternateContent>
+        <p:cxnSp>
+          <p:nvCxnSpPr>
+            <p:cNvPr id="51" name="Straight Connector 50"/>
+            <p:cNvCxnSpPr>
+              <a:endCxn id="46" idx="0"/>
+            </p:cNvCxnSpPr>
+            <p:nvPr/>
+          </p:nvCxnSpPr>
+          <p:spPr>
+            <a:xfrm flipH="1">
+              <a:off x="4053892" y="4819124"/>
+              <a:ext cx="668" cy="201356"/>
+            </a:xfrm>
+            <a:prstGeom prst="line">
+              <a:avLst/>
+            </a:prstGeom>
+            <a:ln w="38100">
+              <a:solidFill>
+                <a:schemeClr val="tx1"/>
+              </a:solidFill>
+            </a:ln>
+          </p:spPr>
+          <p:style>
+            <a:lnRef idx="1">
+              <a:schemeClr val="accent1"/>
+            </a:lnRef>
+            <a:fillRef idx="0">
+              <a:schemeClr val="accent1"/>
+            </a:fillRef>
+            <a:effectRef idx="0">
+              <a:schemeClr val="accent1"/>
+            </a:effectRef>
+            <a:fontRef idx="minor">
+              <a:schemeClr val="tx1"/>
+            </a:fontRef>
+          </p:style>
+        </p:cxnSp>
+        <p:cxnSp>
+          <p:nvCxnSpPr>
+            <p:cNvPr id="53" name="Straight Connector 52"/>
+            <p:cNvCxnSpPr/>
+            <p:nvPr/>
+          </p:nvCxnSpPr>
+          <p:spPr>
+            <a:xfrm flipH="1">
+              <a:off x="5229822" y="4811412"/>
+              <a:ext cx="668" cy="201356"/>
+            </a:xfrm>
+            <a:prstGeom prst="line">
+              <a:avLst/>
+            </a:prstGeom>
+            <a:ln w="38100">
+              <a:solidFill>
+                <a:schemeClr val="tx1"/>
+              </a:solidFill>
+            </a:ln>
+          </p:spPr>
+          <p:style>
+            <a:lnRef idx="1">
+              <a:schemeClr val="accent1"/>
+            </a:lnRef>
+            <a:fillRef idx="0">
+              <a:schemeClr val="accent1"/>
+            </a:fillRef>
+            <a:effectRef idx="0">
+              <a:schemeClr val="accent1"/>
+            </a:effectRef>
+            <a:fontRef idx="minor">
+              <a:schemeClr val="tx1"/>
+            </a:fontRef>
+          </p:style>
+        </p:cxnSp>
+        <p:cxnSp>
+          <p:nvCxnSpPr>
+            <p:cNvPr id="54" name="Straight Connector 53"/>
+            <p:cNvCxnSpPr/>
+            <p:nvPr/>
+          </p:nvCxnSpPr>
+          <p:spPr>
+            <a:xfrm flipH="1">
+              <a:off x="2897752" y="4815118"/>
+              <a:ext cx="668" cy="201356"/>
+            </a:xfrm>
+            <a:prstGeom prst="line">
+              <a:avLst/>
+            </a:prstGeom>
+            <a:ln w="38100">
+              <a:solidFill>
+                <a:schemeClr val="tx1"/>
+              </a:solidFill>
+            </a:ln>
+          </p:spPr>
+          <p:style>
+            <a:lnRef idx="1">
+              <a:schemeClr val="accent1"/>
+            </a:lnRef>
+            <a:fillRef idx="0">
+              <a:schemeClr val="accent1"/>
+            </a:fillRef>
+            <a:effectRef idx="0">
+              <a:schemeClr val="accent1"/>
+            </a:effectRef>
+            <a:fontRef idx="minor">
+              <a:schemeClr val="tx1"/>
+            </a:fontRef>
+          </p:style>
+        </p:cxnSp>
+        <p:sp>
+          <p:nvSpPr>
+            <p:cNvPr id="56" name="TextBox 55"/>
+            <p:cNvSpPr txBox="1"/>
+            <p:nvPr/>
+          </p:nvSpPr>
+          <p:spPr>
+            <a:xfrm>
+              <a:off x="2346051" y="1905279"/>
+              <a:ext cx="2055043" cy="492443"/>
+            </a:xfrm>
+            <a:prstGeom prst="rect">
+              <a:avLst/>
+            </a:prstGeom>
+            <a:noFill/>
+          </p:spPr>
+          <p:txBody>
+            <a:bodyPr wrap="square" rtlCol="0">
+              <a:spAutoFit/>
+            </a:bodyPr>
+            <a:lstStyle/>
+            <a:p>
+              <a:r>
+                <a:rPr lang="en-US" sz="2600" dirty="0" smtClean="0">
+                  <a:latin typeface="Wingdings 2" charset="2"/>
+                  <a:ea typeface="Wingdings 2" charset="2"/>
+                  <a:cs typeface="Wingdings 2" charset="2"/>
+                </a:rPr>
+                <a:t>j</a:t>
+              </a:r>
+              <a:endParaRPr lang="en-US" sz="2600" dirty="0" smtClean="0">
+                <a:latin typeface="Wingdings 2" charset="2"/>
+                <a:ea typeface="Wingdings 2" charset="2"/>
+                <a:cs typeface="Wingdings 2" charset="2"/>
+              </a:endParaRPr>
+            </a:p>
+          </p:txBody>
+        </p:sp>
+        <p:sp>
+          <p:nvSpPr>
+            <p:cNvPr id="57" name="TextBox 56"/>
+            <p:cNvSpPr txBox="1"/>
+            <p:nvPr/>
+          </p:nvSpPr>
+          <p:spPr>
+            <a:xfrm>
+              <a:off x="2783129" y="908146"/>
+              <a:ext cx="427728" cy="492443"/>
+            </a:xfrm>
+            <a:prstGeom prst="rect">
+              <a:avLst/>
+            </a:prstGeom>
+            <a:noFill/>
+          </p:spPr>
+          <p:txBody>
+            <a:bodyPr wrap="square" rtlCol="0">
+              <a:spAutoFit/>
+            </a:bodyPr>
+            <a:lstStyle/>
+            <a:p>
+              <a:r>
+                <a:rPr lang="en-US" sz="2600" dirty="0" smtClean="0">
+                  <a:latin typeface="Wingdings 2" charset="2"/>
+                  <a:ea typeface="Wingdings 2" charset="2"/>
+                  <a:cs typeface="Wingdings 2" charset="2"/>
+                </a:rPr>
+                <a:t>k</a:t>
+              </a:r>
+              <a:endParaRPr lang="en-US" sz="2600" dirty="0" smtClean="0">
+                <a:latin typeface="Wingdings 2" charset="2"/>
+                <a:ea typeface="Wingdings 2" charset="2"/>
+                <a:cs typeface="Wingdings 2" charset="2"/>
+              </a:endParaRPr>
+            </a:p>
+          </p:txBody>
+        </p:sp>
+        <p:sp>
+          <p:nvSpPr>
+            <p:cNvPr id="58" name="TextBox 57"/>
+            <p:cNvSpPr txBox="1"/>
+            <p:nvPr/>
+          </p:nvSpPr>
+          <p:spPr>
+            <a:xfrm>
+              <a:off x="3833918" y="405286"/>
+              <a:ext cx="439946" cy="492443"/>
+            </a:xfrm>
+            <a:prstGeom prst="rect">
+              <a:avLst/>
+            </a:prstGeom>
+            <a:noFill/>
+          </p:spPr>
+          <p:txBody>
+            <a:bodyPr wrap="square" rtlCol="0">
+              <a:spAutoFit/>
+            </a:bodyPr>
+            <a:lstStyle/>
+            <a:p>
+              <a:r>
+                <a:rPr lang="en-US" sz="2600" dirty="0" smtClean="0">
+                  <a:latin typeface="Wingdings 2" charset="2"/>
+                  <a:ea typeface="Wingdings 2" charset="2"/>
+                  <a:cs typeface="Wingdings 2" charset="2"/>
+                </a:rPr>
+                <a:t>l</a:t>
+              </a:r>
+              <a:endParaRPr lang="en-US" sz="2600" dirty="0" smtClean="0">
+                <a:latin typeface="Wingdings 2" charset="2"/>
+                <a:ea typeface="Wingdings 2" charset="2"/>
+                <a:cs typeface="Wingdings 2" charset="2"/>
+              </a:endParaRPr>
+            </a:p>
+          </p:txBody>
+        </p:sp>
+        <p:sp>
+          <p:nvSpPr>
+            <p:cNvPr id="59" name="TextBox 58"/>
+            <p:cNvSpPr txBox="1"/>
+            <p:nvPr/>
+          </p:nvSpPr>
+          <p:spPr>
+            <a:xfrm>
+              <a:off x="4949254" y="862089"/>
+              <a:ext cx="464611" cy="492443"/>
+            </a:xfrm>
+            <a:prstGeom prst="rect">
+              <a:avLst/>
+            </a:prstGeom>
+            <a:noFill/>
+          </p:spPr>
+          <p:txBody>
+            <a:bodyPr wrap="square" rtlCol="0">
+              <a:spAutoFit/>
+            </a:bodyPr>
+            <a:lstStyle/>
+            <a:p>
+              <a:r>
+                <a:rPr lang="en-US" sz="2600" dirty="0" smtClean="0">
+                  <a:latin typeface="Wingdings 2" charset="2"/>
+                  <a:ea typeface="Wingdings 2" charset="2"/>
+                  <a:cs typeface="Wingdings 2" charset="2"/>
+                </a:rPr>
+                <a:t>m</a:t>
+              </a:r>
+              <a:endParaRPr lang="en-US" sz="2600" dirty="0" smtClean="0">
+                <a:latin typeface="Wingdings 2" charset="2"/>
+                <a:ea typeface="Wingdings 2" charset="2"/>
+                <a:cs typeface="Wingdings 2" charset="2"/>
+              </a:endParaRPr>
+            </a:p>
+          </p:txBody>
+        </p:sp>
+        <p:sp>
+          <p:nvSpPr>
+            <p:cNvPr id="60" name="TextBox 59"/>
+            <p:cNvSpPr txBox="1"/>
+            <p:nvPr/>
+          </p:nvSpPr>
+          <p:spPr>
+            <a:xfrm>
+              <a:off x="5334710" y="1929867"/>
+              <a:ext cx="500914" cy="492443"/>
+            </a:xfrm>
+            <a:prstGeom prst="rect">
+              <a:avLst/>
+            </a:prstGeom>
+            <a:noFill/>
+          </p:spPr>
+          <p:txBody>
+            <a:bodyPr wrap="square" rtlCol="0">
+              <a:spAutoFit/>
+            </a:bodyPr>
+            <a:lstStyle/>
+            <a:p>
+              <a:r>
+                <a:rPr lang="en-US" sz="2600" dirty="0" smtClean="0">
+                  <a:latin typeface="Wingdings 2" charset="2"/>
+                  <a:ea typeface="Wingdings 2" charset="2"/>
+                  <a:cs typeface="Wingdings 2" charset="2"/>
+                </a:rPr>
+                <a:t>n</a:t>
+              </a:r>
+              <a:endParaRPr lang="en-US" sz="2600" dirty="0" smtClean="0">
+                <a:latin typeface="Wingdings 2" charset="2"/>
+                <a:ea typeface="Wingdings 2" charset="2"/>
+                <a:cs typeface="Wingdings 2" charset="2"/>
+              </a:endParaRPr>
+            </a:p>
+          </p:txBody>
+        </p:sp>
+      </p:grpSp>
+    </p:spTree>
+    <p:extLst>
+      <p:ext uri="{BB962C8B-B14F-4D97-AF65-F5344CB8AC3E}">
+        <p14:creationId xmlns:p14="http://schemas.microsoft.com/office/powerpoint/2010/main" val="618945343"/>
+      </p:ext>
+    </p:extLst>
+  </p:cSld>
+  <p:clrMapOvr>
+    <a:masterClrMapping/>
+  </p:clrMapOvr>
+</p:sld>
+</file>
+
 <file path=ppt/theme/theme1.xml><?xml version="1.0" encoding="utf-8"?>
 <a:theme xmlns:a="http://schemas.openxmlformats.org/drawingml/2006/main" name="Office Theme">
   <a:themeElements>

</xml_diff>